<commit_message>
Actualización sin Carta Gantt
</commit_message>
<xml_diff>
--- a/presentacion.pptx
+++ b/presentacion.pptx
@@ -16,6 +16,7 @@
     <p:sldId id="262" r:id="rId10"/>
     <p:sldId id="268" r:id="rId11"/>
     <p:sldId id="264" r:id="rId12"/>
+    <p:sldId id="272" r:id="rId13"/>
   </p:sldIdLst>
   <p:sldSz cx="12192000" cy="6858000"/>
   <p:notesSz cx="6858000" cy="9144000"/>
@@ -172,7 +173,7 @@
           <a:noFill/>
           <a:extLst>
             <a:ext uri="{909E8E84-426E-40dd-AFC4-6F175D3DCCD1}">
-              <a14:hiddenFill xmlns="" xmlns:a14="http://schemas.microsoft.com/office/drawing/2010/main">
+              <a14:hiddenFill xmlns:a14="http://schemas.microsoft.com/office/drawing/2010/main" xmlns="">
                 <a:solidFill>
                   <a:srgbClr val="FFFFFF"/>
                 </a:solidFill>
@@ -232,7 +233,7 @@
             </a:ln>
             <a:extLst>
               <a:ext uri="{91240B29-F687-4f45-9708-019B960494DF}">
-                <a14:hiddenLine xmlns="" xmlns:a14="http://schemas.microsoft.com/office/drawing/2010/main" w="9525">
+                <a14:hiddenLine xmlns:a14="http://schemas.microsoft.com/office/drawing/2010/main" xmlns="" w="9525">
                   <a:solidFill>
                     <a:srgbClr val="000000"/>
                   </a:solidFill>
@@ -322,7 +323,7 @@
             </a:ln>
             <a:extLst>
               <a:ext uri="{91240B29-F687-4f45-9708-019B960494DF}">
-                <a14:hiddenLine xmlns="" xmlns:a14="http://schemas.microsoft.com/office/drawing/2010/main" w="9525">
+                <a14:hiddenLine xmlns:a14="http://schemas.microsoft.com/office/drawing/2010/main" xmlns="" w="9525">
                   <a:solidFill>
                     <a:srgbClr val="000000"/>
                   </a:solidFill>
@@ -412,7 +413,7 @@
             </a:ln>
             <a:extLst>
               <a:ext uri="{91240B29-F687-4f45-9708-019B960494DF}">
-                <a14:hiddenLine xmlns="" xmlns:a14="http://schemas.microsoft.com/office/drawing/2010/main" w="9525">
+                <a14:hiddenLine xmlns:a14="http://schemas.microsoft.com/office/drawing/2010/main" xmlns="" w="9525">
                   <a:solidFill>
                     <a:srgbClr val="000000"/>
                   </a:solidFill>
@@ -446,7 +447,7 @@
             </a:ln>
             <a:extLst>
               <a:ext uri="{91240B29-F687-4f45-9708-019B960494DF}">
-                <a14:hiddenLine xmlns="" xmlns:a14="http://schemas.microsoft.com/office/drawing/2010/main" w="9525">
+                <a14:hiddenLine xmlns:a14="http://schemas.microsoft.com/office/drawing/2010/main" xmlns="" w="9525">
                   <a:solidFill>
                     <a:srgbClr val="000000"/>
                   </a:solidFill>
@@ -536,7 +537,7 @@
             </a:ln>
             <a:extLst>
               <a:ext uri="{91240B29-F687-4f45-9708-019B960494DF}">
-                <a14:hiddenLine xmlns="" xmlns:a14="http://schemas.microsoft.com/office/drawing/2010/main" w="9525">
+                <a14:hiddenLine xmlns:a14="http://schemas.microsoft.com/office/drawing/2010/main" xmlns="" w="9525">
                   <a:solidFill>
                     <a:srgbClr val="000000"/>
                   </a:solidFill>
@@ -598,7 +599,7 @@
             </a:ln>
             <a:extLst>
               <a:ext uri="{91240B29-F687-4f45-9708-019B960494DF}">
-                <a14:hiddenLine xmlns="" xmlns:a14="http://schemas.microsoft.com/office/drawing/2010/main" w="9525">
+                <a14:hiddenLine xmlns:a14="http://schemas.microsoft.com/office/drawing/2010/main" xmlns="" w="9525">
                   <a:solidFill>
                     <a:srgbClr val="000000"/>
                   </a:solidFill>
@@ -660,7 +661,7 @@
             </a:ln>
             <a:extLst>
               <a:ext uri="{91240B29-F687-4f45-9708-019B960494DF}">
-                <a14:hiddenLine xmlns="" xmlns:a14="http://schemas.microsoft.com/office/drawing/2010/main" w="9525">
+                <a14:hiddenLine xmlns:a14="http://schemas.microsoft.com/office/drawing/2010/main" xmlns="" w="9525">
                   <a:solidFill>
                     <a:srgbClr val="000000"/>
                   </a:solidFill>
@@ -750,7 +751,7 @@
             </a:ln>
             <a:extLst>
               <a:ext uri="{91240B29-F687-4f45-9708-019B960494DF}">
-                <a14:hiddenLine xmlns="" xmlns:a14="http://schemas.microsoft.com/office/drawing/2010/main" w="9525">
+                <a14:hiddenLine xmlns:a14="http://schemas.microsoft.com/office/drawing/2010/main" xmlns="" w="9525">
                   <a:solidFill>
                     <a:srgbClr val="000000"/>
                   </a:solidFill>
@@ -812,7 +813,7 @@
             </a:ln>
             <a:extLst>
               <a:ext uri="{91240B29-F687-4f45-9708-019B960494DF}">
-                <a14:hiddenLine xmlns="" xmlns:a14="http://schemas.microsoft.com/office/drawing/2010/main" w="9525">
+                <a14:hiddenLine xmlns:a14="http://schemas.microsoft.com/office/drawing/2010/main" xmlns="" w="9525">
                   <a:solidFill>
                     <a:srgbClr val="000000"/>
                   </a:solidFill>
@@ -874,7 +875,7 @@
             </a:ln>
             <a:extLst>
               <a:ext uri="{91240B29-F687-4f45-9708-019B960494DF}">
-                <a14:hiddenLine xmlns="" xmlns:a14="http://schemas.microsoft.com/office/drawing/2010/main" w="9525">
+                <a14:hiddenLine xmlns:a14="http://schemas.microsoft.com/office/drawing/2010/main" xmlns="" w="9525">
                   <a:solidFill>
                     <a:srgbClr val="000000"/>
                   </a:solidFill>
@@ -964,7 +965,7 @@
             </a:ln>
             <a:extLst>
               <a:ext uri="{91240B29-F687-4f45-9708-019B960494DF}">
-                <a14:hiddenLine xmlns="" xmlns:a14="http://schemas.microsoft.com/office/drawing/2010/main" w="9525">
+                <a14:hiddenLine xmlns:a14="http://schemas.microsoft.com/office/drawing/2010/main" xmlns="" w="9525">
                   <a:solidFill>
                     <a:srgbClr val="000000"/>
                   </a:solidFill>
@@ -1054,7 +1055,7 @@
             </a:ln>
             <a:extLst>
               <a:ext uri="{91240B29-F687-4f45-9708-019B960494DF}">
-                <a14:hiddenLine xmlns="" xmlns:a14="http://schemas.microsoft.com/office/drawing/2010/main" w="9525">
+                <a14:hiddenLine xmlns:a14="http://schemas.microsoft.com/office/drawing/2010/main" xmlns="" w="9525">
                   <a:solidFill>
                     <a:srgbClr val="000000"/>
                   </a:solidFill>
@@ -1116,7 +1117,7 @@
             </a:ln>
             <a:extLst>
               <a:ext uri="{91240B29-F687-4f45-9708-019B960494DF}">
-                <a14:hiddenLine xmlns="" xmlns:a14="http://schemas.microsoft.com/office/drawing/2010/main" w="9525">
+                <a14:hiddenLine xmlns:a14="http://schemas.microsoft.com/office/drawing/2010/main" xmlns="" w="9525">
                   <a:solidFill>
                     <a:srgbClr val="000000"/>
                   </a:solidFill>
@@ -1226,7 +1227,7 @@
             </a:ln>
             <a:extLst>
               <a:ext uri="{91240B29-F687-4f45-9708-019B960494DF}">
-                <a14:hiddenLine xmlns="" xmlns:a14="http://schemas.microsoft.com/office/drawing/2010/main" w="9525">
+                <a14:hiddenLine xmlns:a14="http://schemas.microsoft.com/office/drawing/2010/main" xmlns="" w="9525">
                   <a:solidFill>
                     <a:srgbClr val="000000"/>
                   </a:solidFill>
@@ -1288,7 +1289,7 @@
             </a:ln>
             <a:extLst>
               <a:ext uri="{91240B29-F687-4f45-9708-019B960494DF}">
-                <a14:hiddenLine xmlns="" xmlns:a14="http://schemas.microsoft.com/office/drawing/2010/main" w="9525">
+                <a14:hiddenLine xmlns:a14="http://schemas.microsoft.com/office/drawing/2010/main" xmlns="" w="9525">
                   <a:solidFill>
                     <a:srgbClr val="000000"/>
                   </a:solidFill>
@@ -1378,7 +1379,7 @@
             </a:ln>
             <a:extLst>
               <a:ext uri="{91240B29-F687-4f45-9708-019B960494DF}">
-                <a14:hiddenLine xmlns="" xmlns:a14="http://schemas.microsoft.com/office/drawing/2010/main" w="9525">
+                <a14:hiddenLine xmlns:a14="http://schemas.microsoft.com/office/drawing/2010/main" xmlns="" w="9525">
                   <a:solidFill>
                     <a:srgbClr val="000000"/>
                   </a:solidFill>
@@ -1468,7 +1469,7 @@
             </a:ln>
             <a:extLst>
               <a:ext uri="{91240B29-F687-4f45-9708-019B960494DF}">
-                <a14:hiddenLine xmlns="" xmlns:a14="http://schemas.microsoft.com/office/drawing/2010/main" w="9525">
+                <a14:hiddenLine xmlns:a14="http://schemas.microsoft.com/office/drawing/2010/main" xmlns="" w="9525">
                   <a:solidFill>
                     <a:srgbClr val="000000"/>
                   </a:solidFill>
@@ -1530,7 +1531,7 @@
             </a:ln>
             <a:extLst>
               <a:ext uri="{91240B29-F687-4f45-9708-019B960494DF}">
-                <a14:hiddenLine xmlns="" xmlns:a14="http://schemas.microsoft.com/office/drawing/2010/main" w="9525">
+                <a14:hiddenLine xmlns:a14="http://schemas.microsoft.com/office/drawing/2010/main" xmlns="" w="9525">
                   <a:solidFill>
                     <a:srgbClr val="000000"/>
                   </a:solidFill>
@@ -1620,7 +1621,7 @@
             </a:ln>
             <a:extLst>
               <a:ext uri="{91240B29-F687-4f45-9708-019B960494DF}">
-                <a14:hiddenLine xmlns="" xmlns:a14="http://schemas.microsoft.com/office/drawing/2010/main" w="9525">
+                <a14:hiddenLine xmlns:a14="http://schemas.microsoft.com/office/drawing/2010/main" xmlns="" w="9525">
                   <a:solidFill>
                     <a:srgbClr val="000000"/>
                   </a:solidFill>
@@ -1710,7 +1711,7 @@
             </a:ln>
             <a:extLst>
               <a:ext uri="{91240B29-F687-4f45-9708-019B960494DF}">
-                <a14:hiddenLine xmlns="" xmlns:a14="http://schemas.microsoft.com/office/drawing/2010/main" w="9525">
+                <a14:hiddenLine xmlns:a14="http://schemas.microsoft.com/office/drawing/2010/main" xmlns="" w="9525">
                   <a:solidFill>
                     <a:srgbClr val="000000"/>
                   </a:solidFill>
@@ -1766,7 +1767,7 @@
             </a:ln>
             <a:extLst>
               <a:ext uri="{91240B29-F687-4f45-9708-019B960494DF}">
-                <a14:hiddenLine xmlns="" xmlns:a14="http://schemas.microsoft.com/office/drawing/2010/main" w="9525">
+                <a14:hiddenLine xmlns:a14="http://schemas.microsoft.com/office/drawing/2010/main" xmlns="" w="9525">
                   <a:solidFill>
                     <a:srgbClr val="000000"/>
                   </a:solidFill>
@@ -1856,7 +1857,7 @@
             </a:ln>
             <a:extLst>
               <a:ext uri="{91240B29-F687-4f45-9708-019B960494DF}">
-                <a14:hiddenLine xmlns="" xmlns:a14="http://schemas.microsoft.com/office/drawing/2010/main" w="9525">
+                <a14:hiddenLine xmlns:a14="http://schemas.microsoft.com/office/drawing/2010/main" xmlns="" w="9525">
                   <a:solidFill>
                     <a:srgbClr val="000000"/>
                   </a:solidFill>
@@ -1912,7 +1913,7 @@
             </a:ln>
             <a:extLst>
               <a:ext uri="{91240B29-F687-4f45-9708-019B960494DF}">
-                <a14:hiddenLine xmlns="" xmlns:a14="http://schemas.microsoft.com/office/drawing/2010/main" w="9525">
+                <a14:hiddenLine xmlns:a14="http://schemas.microsoft.com/office/drawing/2010/main" xmlns="" w="9525">
                   <a:solidFill>
                     <a:srgbClr val="000000"/>
                   </a:solidFill>
@@ -2002,7 +2003,7 @@
             </a:ln>
             <a:extLst>
               <a:ext uri="{91240B29-F687-4f45-9708-019B960494DF}">
-                <a14:hiddenLine xmlns="" xmlns:a14="http://schemas.microsoft.com/office/drawing/2010/main" w="9525">
+                <a14:hiddenLine xmlns:a14="http://schemas.microsoft.com/office/drawing/2010/main" xmlns="" w="9525">
                   <a:solidFill>
                     <a:srgbClr val="000000"/>
                   </a:solidFill>
@@ -2070,7 +2071,7 @@
             </a:ln>
             <a:extLst>
               <a:ext uri="{91240B29-F687-4f45-9708-019B960494DF}">
-                <a14:hiddenLine xmlns="" xmlns:a14="http://schemas.microsoft.com/office/drawing/2010/main" w="9525">
+                <a14:hiddenLine xmlns:a14="http://schemas.microsoft.com/office/drawing/2010/main" xmlns="" w="9525">
                   <a:solidFill>
                     <a:srgbClr val="000000"/>
                   </a:solidFill>
@@ -2160,7 +2161,7 @@
             </a:ln>
             <a:extLst>
               <a:ext uri="{91240B29-F687-4f45-9708-019B960494DF}">
-                <a14:hiddenLine xmlns="" xmlns:a14="http://schemas.microsoft.com/office/drawing/2010/main" w="9525">
+                <a14:hiddenLine xmlns:a14="http://schemas.microsoft.com/office/drawing/2010/main" xmlns="" w="9525">
                   <a:solidFill>
                     <a:srgbClr val="000000"/>
                   </a:solidFill>
@@ -2228,7 +2229,7 @@
             </a:ln>
             <a:extLst>
               <a:ext uri="{91240B29-F687-4f45-9708-019B960494DF}">
-                <a14:hiddenLine xmlns="" xmlns:a14="http://schemas.microsoft.com/office/drawing/2010/main" w="9525">
+                <a14:hiddenLine xmlns:a14="http://schemas.microsoft.com/office/drawing/2010/main" xmlns="" w="9525">
                   <a:solidFill>
                     <a:srgbClr val="000000"/>
                   </a:solidFill>
@@ -2318,7 +2319,7 @@
             </a:ln>
             <a:extLst>
               <a:ext uri="{91240B29-F687-4f45-9708-019B960494DF}">
-                <a14:hiddenLine xmlns="" xmlns:a14="http://schemas.microsoft.com/office/drawing/2010/main" w="9525">
+                <a14:hiddenLine xmlns:a14="http://schemas.microsoft.com/office/drawing/2010/main" xmlns="" w="9525">
                   <a:solidFill>
                     <a:srgbClr val="000000"/>
                   </a:solidFill>
@@ -2352,7 +2353,7 @@
             </a:ln>
             <a:extLst>
               <a:ext uri="{91240B29-F687-4f45-9708-019B960494DF}">
-                <a14:hiddenLine xmlns="" xmlns:a14="http://schemas.microsoft.com/office/drawing/2010/main" w="9525">
+                <a14:hiddenLine xmlns:a14="http://schemas.microsoft.com/office/drawing/2010/main" xmlns="" w="9525">
                   <a:solidFill>
                     <a:srgbClr val="000000"/>
                   </a:solidFill>
@@ -2442,7 +2443,7 @@
             </a:ln>
             <a:extLst>
               <a:ext uri="{91240B29-F687-4f45-9708-019B960494DF}">
-                <a14:hiddenLine xmlns="" xmlns:a14="http://schemas.microsoft.com/office/drawing/2010/main" w="9525">
+                <a14:hiddenLine xmlns:a14="http://schemas.microsoft.com/office/drawing/2010/main" xmlns="" w="9525">
                   <a:solidFill>
                     <a:srgbClr val="000000"/>
                   </a:solidFill>
@@ -2504,7 +2505,7 @@
             </a:ln>
             <a:extLst>
               <a:ext uri="{91240B29-F687-4f45-9708-019B960494DF}">
-                <a14:hiddenLine xmlns="" xmlns:a14="http://schemas.microsoft.com/office/drawing/2010/main" w="9525">
+                <a14:hiddenLine xmlns:a14="http://schemas.microsoft.com/office/drawing/2010/main" xmlns="" w="9525">
                   <a:solidFill>
                     <a:srgbClr val="000000"/>
                   </a:solidFill>
@@ -2566,7 +2567,7 @@
             </a:ln>
             <a:extLst>
               <a:ext uri="{91240B29-F687-4f45-9708-019B960494DF}">
-                <a14:hiddenLine xmlns="" xmlns:a14="http://schemas.microsoft.com/office/drawing/2010/main" w="9525">
+                <a14:hiddenLine xmlns:a14="http://schemas.microsoft.com/office/drawing/2010/main" xmlns="" w="9525">
                   <a:solidFill>
                     <a:srgbClr val="000000"/>
                   </a:solidFill>
@@ -2656,7 +2657,7 @@
             </a:ln>
             <a:extLst>
               <a:ext uri="{91240B29-F687-4f45-9708-019B960494DF}">
-                <a14:hiddenLine xmlns="" xmlns:a14="http://schemas.microsoft.com/office/drawing/2010/main" w="9525">
+                <a14:hiddenLine xmlns:a14="http://schemas.microsoft.com/office/drawing/2010/main" xmlns="" w="9525">
                   <a:solidFill>
                     <a:srgbClr val="000000"/>
                   </a:solidFill>
@@ -2724,7 +2725,7 @@
             </a:ln>
             <a:extLst>
               <a:ext uri="{91240B29-F687-4f45-9708-019B960494DF}">
-                <a14:hiddenLine xmlns="" xmlns:a14="http://schemas.microsoft.com/office/drawing/2010/main" w="9525">
+                <a14:hiddenLine xmlns:a14="http://schemas.microsoft.com/office/drawing/2010/main" xmlns="" w="9525">
                   <a:solidFill>
                     <a:srgbClr val="000000"/>
                   </a:solidFill>
@@ -2786,7 +2787,7 @@
             </a:ln>
             <a:extLst>
               <a:ext uri="{91240B29-F687-4f45-9708-019B960494DF}">
-                <a14:hiddenLine xmlns="" xmlns:a14="http://schemas.microsoft.com/office/drawing/2010/main" w="9525">
+                <a14:hiddenLine xmlns:a14="http://schemas.microsoft.com/office/drawing/2010/main" xmlns="" w="9525">
                   <a:solidFill>
                     <a:srgbClr val="000000"/>
                   </a:solidFill>
@@ -2876,7 +2877,7 @@
             </a:ln>
             <a:extLst>
               <a:ext uri="{91240B29-F687-4f45-9708-019B960494DF}">
-                <a14:hiddenLine xmlns="" xmlns:a14="http://schemas.microsoft.com/office/drawing/2010/main" w="9525">
+                <a14:hiddenLine xmlns:a14="http://schemas.microsoft.com/office/drawing/2010/main" xmlns="" w="9525">
                   <a:solidFill>
                     <a:srgbClr val="000000"/>
                   </a:solidFill>
@@ -2938,7 +2939,7 @@
             </a:ln>
             <a:extLst>
               <a:ext uri="{91240B29-F687-4f45-9708-019B960494DF}">
-                <a14:hiddenLine xmlns="" xmlns:a14="http://schemas.microsoft.com/office/drawing/2010/main" w="9525">
+                <a14:hiddenLine xmlns:a14="http://schemas.microsoft.com/office/drawing/2010/main" xmlns="" w="9525">
                   <a:solidFill>
                     <a:srgbClr val="000000"/>
                   </a:solidFill>
@@ -3028,7 +3029,7 @@
             </a:ln>
             <a:extLst>
               <a:ext uri="{91240B29-F687-4f45-9708-019B960494DF}">
-                <a14:hiddenLine xmlns="" xmlns:a14="http://schemas.microsoft.com/office/drawing/2010/main" w="9525">
+                <a14:hiddenLine xmlns:a14="http://schemas.microsoft.com/office/drawing/2010/main" xmlns="" w="9525">
                   <a:solidFill>
                     <a:srgbClr val="000000"/>
                   </a:solidFill>
@@ -3090,7 +3091,7 @@
             </a:ln>
             <a:extLst>
               <a:ext uri="{91240B29-F687-4f45-9708-019B960494DF}">
-                <a14:hiddenLine xmlns="" xmlns:a14="http://schemas.microsoft.com/office/drawing/2010/main" w="9525">
+                <a14:hiddenLine xmlns:a14="http://schemas.microsoft.com/office/drawing/2010/main" xmlns="" w="9525">
                   <a:solidFill>
                     <a:srgbClr val="000000"/>
                   </a:solidFill>
@@ -3180,7 +3181,7 @@
             </a:ln>
             <a:extLst>
               <a:ext uri="{91240B29-F687-4f45-9708-019B960494DF}">
-                <a14:hiddenLine xmlns="" xmlns:a14="http://schemas.microsoft.com/office/drawing/2010/main" w="9525">
+                <a14:hiddenLine xmlns:a14="http://schemas.microsoft.com/office/drawing/2010/main" xmlns="" w="9525">
                   <a:solidFill>
                     <a:srgbClr val="000000"/>
                   </a:solidFill>
@@ -3214,7 +3215,7 @@
             </a:ln>
             <a:extLst>
               <a:ext uri="{91240B29-F687-4f45-9708-019B960494DF}">
-                <a14:hiddenLine xmlns="" xmlns:a14="http://schemas.microsoft.com/office/drawing/2010/main" w="9525">
+                <a14:hiddenLine xmlns:a14="http://schemas.microsoft.com/office/drawing/2010/main" xmlns="" w="9525">
                   <a:solidFill>
                     <a:srgbClr val="000000"/>
                   </a:solidFill>
@@ -3279,7 +3280,7 @@
             </a:ln>
             <a:extLst>
               <a:ext uri="{91240B29-F687-4f45-9708-019B960494DF}">
-                <a14:hiddenLine xmlns="" xmlns:a14="http://schemas.microsoft.com/office/drawing/2010/main" w="9525">
+                <a14:hiddenLine xmlns:a14="http://schemas.microsoft.com/office/drawing/2010/main" xmlns="" w="9525">
                   <a:solidFill>
                     <a:srgbClr val="000000"/>
                   </a:solidFill>
@@ -3369,7 +3370,7 @@
             </a:ln>
             <a:extLst>
               <a:ext uri="{91240B29-F687-4f45-9708-019B960494DF}">
-                <a14:hiddenLine xmlns="" xmlns:a14="http://schemas.microsoft.com/office/drawing/2010/main" w="9525">
+                <a14:hiddenLine xmlns:a14="http://schemas.microsoft.com/office/drawing/2010/main" xmlns="" w="9525">
                   <a:solidFill>
                     <a:srgbClr val="000000"/>
                   </a:solidFill>
@@ -3431,7 +3432,7 @@
             </a:ln>
             <a:extLst>
               <a:ext uri="{91240B29-F687-4f45-9708-019B960494DF}">
-                <a14:hiddenLine xmlns="" xmlns:a14="http://schemas.microsoft.com/office/drawing/2010/main" w="9525">
+                <a14:hiddenLine xmlns:a14="http://schemas.microsoft.com/office/drawing/2010/main" xmlns="" w="9525">
                   <a:solidFill>
                     <a:srgbClr val="000000"/>
                   </a:solidFill>
@@ -3521,7 +3522,7 @@
             </a:ln>
             <a:extLst>
               <a:ext uri="{91240B29-F687-4f45-9708-019B960494DF}">
-                <a14:hiddenLine xmlns="" xmlns:a14="http://schemas.microsoft.com/office/drawing/2010/main" w="9525">
+                <a14:hiddenLine xmlns:a14="http://schemas.microsoft.com/office/drawing/2010/main" xmlns="" w="9525">
                   <a:solidFill>
                     <a:srgbClr val="000000"/>
                   </a:solidFill>
@@ -3611,7 +3612,7 @@
             </a:ln>
             <a:extLst>
               <a:ext uri="{91240B29-F687-4f45-9708-019B960494DF}">
-                <a14:hiddenLine xmlns="" xmlns:a14="http://schemas.microsoft.com/office/drawing/2010/main" w="9525">
+                <a14:hiddenLine xmlns:a14="http://schemas.microsoft.com/office/drawing/2010/main" xmlns="" w="9525">
                   <a:solidFill>
                     <a:srgbClr val="000000"/>
                   </a:solidFill>
@@ -3676,7 +3677,7 @@
             </a:ln>
             <a:extLst>
               <a:ext uri="{91240B29-F687-4f45-9708-019B960494DF}">
-                <a14:hiddenLine xmlns="" xmlns:a14="http://schemas.microsoft.com/office/drawing/2010/main" w="9525">
+                <a14:hiddenLine xmlns:a14="http://schemas.microsoft.com/office/drawing/2010/main" xmlns="" w="9525">
                   <a:solidFill>
                     <a:srgbClr val="000000"/>
                   </a:solidFill>
@@ -3738,7 +3739,7 @@
             </a:ln>
             <a:extLst>
               <a:ext uri="{91240B29-F687-4f45-9708-019B960494DF}">
-                <a14:hiddenLine xmlns="" xmlns:a14="http://schemas.microsoft.com/office/drawing/2010/main" w="9525">
+                <a14:hiddenLine xmlns:a14="http://schemas.microsoft.com/office/drawing/2010/main" xmlns="" w="9525">
                   <a:solidFill>
                     <a:srgbClr val="000000"/>
                   </a:solidFill>
@@ -3828,7 +3829,7 @@
             </a:ln>
             <a:extLst>
               <a:ext uri="{91240B29-F687-4f45-9708-019B960494DF}">
-                <a14:hiddenLine xmlns="" xmlns:a14="http://schemas.microsoft.com/office/drawing/2010/main" w="9525">
+                <a14:hiddenLine xmlns:a14="http://schemas.microsoft.com/office/drawing/2010/main" xmlns="" w="9525">
                   <a:solidFill>
                     <a:srgbClr val="000000"/>
                   </a:solidFill>
@@ -3918,7 +3919,7 @@
             </a:ln>
             <a:extLst>
               <a:ext uri="{91240B29-F687-4f45-9708-019B960494DF}">
-                <a14:hiddenLine xmlns="" xmlns:a14="http://schemas.microsoft.com/office/drawing/2010/main" w="9525">
+                <a14:hiddenLine xmlns:a14="http://schemas.microsoft.com/office/drawing/2010/main" xmlns="" w="9525">
                   <a:solidFill>
                     <a:srgbClr val="000000"/>
                   </a:solidFill>
@@ -3980,7 +3981,7 @@
             </a:ln>
             <a:extLst>
               <a:ext uri="{91240B29-F687-4f45-9708-019B960494DF}">
-                <a14:hiddenLine xmlns="" xmlns:a14="http://schemas.microsoft.com/office/drawing/2010/main" w="9525">
+                <a14:hiddenLine xmlns:a14="http://schemas.microsoft.com/office/drawing/2010/main" xmlns="" w="9525">
                   <a:solidFill>
                     <a:srgbClr val="000000"/>
                   </a:solidFill>
@@ -4100,7 +4101,7 @@
             </a:ln>
             <a:extLst>
               <a:ext uri="{91240B29-F687-4f45-9708-019B960494DF}">
-                <a14:hiddenLine xmlns="" xmlns:a14="http://schemas.microsoft.com/office/drawing/2010/main" w="9525">
+                <a14:hiddenLine xmlns:a14="http://schemas.microsoft.com/office/drawing/2010/main" xmlns="" w="9525">
                   <a:solidFill>
                     <a:srgbClr val="000000"/>
                   </a:solidFill>
@@ -4168,7 +4169,7 @@
             </a:ln>
             <a:extLst>
               <a:ext uri="{91240B29-F687-4f45-9708-019B960494DF}">
-                <a14:hiddenLine xmlns="" xmlns:a14="http://schemas.microsoft.com/office/drawing/2010/main" w="9525">
+                <a14:hiddenLine xmlns:a14="http://schemas.microsoft.com/office/drawing/2010/main" xmlns="" w="9525">
                   <a:solidFill>
                     <a:srgbClr val="000000"/>
                   </a:solidFill>
@@ -4258,7 +4259,7 @@
             </a:ln>
             <a:extLst>
               <a:ext uri="{91240B29-F687-4f45-9708-019B960494DF}">
-                <a14:hiddenLine xmlns="" xmlns:a14="http://schemas.microsoft.com/office/drawing/2010/main" w="9525">
+                <a14:hiddenLine xmlns:a14="http://schemas.microsoft.com/office/drawing/2010/main" xmlns="" w="9525">
                   <a:solidFill>
                     <a:srgbClr val="000000"/>
                   </a:solidFill>
@@ -8980,7 +8981,7 @@
           <a:noFill/>
           <a:extLst>
             <a:ext uri="{909E8E84-426E-40dd-AFC4-6F175D3DCCD1}">
-              <a14:hiddenFill xmlns="" xmlns:a14="http://schemas.microsoft.com/office/drawing/2010/main">
+              <a14:hiddenFill xmlns:a14="http://schemas.microsoft.com/office/drawing/2010/main" xmlns="">
                 <a:solidFill>
                   <a:srgbClr val="FFFFFF"/>
                 </a:solidFill>
@@ -9054,7 +9055,7 @@
               </a:ln>
               <a:extLst>
                 <a:ext uri="{91240B29-F687-4f45-9708-019B960494DF}">
-                  <a14:hiddenLine xmlns="" xmlns:a14="http://schemas.microsoft.com/office/drawing/2010/main" w="9525">
+                  <a14:hiddenLine xmlns:a14="http://schemas.microsoft.com/office/drawing/2010/main" xmlns="" w="9525">
                     <a:solidFill>
                       <a:srgbClr val="000000"/>
                     </a:solidFill>
@@ -9144,7 +9145,7 @@
               </a:ln>
               <a:extLst>
                 <a:ext uri="{91240B29-F687-4f45-9708-019B960494DF}">
-                  <a14:hiddenLine xmlns="" xmlns:a14="http://schemas.microsoft.com/office/drawing/2010/main" w="9525">
+                  <a14:hiddenLine xmlns:a14="http://schemas.microsoft.com/office/drawing/2010/main" xmlns="" w="9525">
                     <a:solidFill>
                       <a:srgbClr val="000000"/>
                     </a:solidFill>
@@ -9234,7 +9235,7 @@
               </a:ln>
               <a:extLst>
                 <a:ext uri="{91240B29-F687-4f45-9708-019B960494DF}">
-                  <a14:hiddenLine xmlns="" xmlns:a14="http://schemas.microsoft.com/office/drawing/2010/main" w="9525">
+                  <a14:hiddenLine xmlns:a14="http://schemas.microsoft.com/office/drawing/2010/main" xmlns="" w="9525">
                     <a:solidFill>
                       <a:srgbClr val="000000"/>
                     </a:solidFill>
@@ -9296,7 +9297,7 @@
               </a:ln>
               <a:extLst>
                 <a:ext uri="{91240B29-F687-4f45-9708-019B960494DF}">
-                  <a14:hiddenLine xmlns="" xmlns:a14="http://schemas.microsoft.com/office/drawing/2010/main" w="9525">
+                  <a14:hiddenLine xmlns:a14="http://schemas.microsoft.com/office/drawing/2010/main" xmlns="" w="9525">
                     <a:solidFill>
                       <a:srgbClr val="000000"/>
                     </a:solidFill>
@@ -9386,7 +9387,7 @@
               </a:ln>
               <a:extLst>
                 <a:ext uri="{91240B29-F687-4f45-9708-019B960494DF}">
-                  <a14:hiddenLine xmlns="" xmlns:a14="http://schemas.microsoft.com/office/drawing/2010/main" w="9525">
+                  <a14:hiddenLine xmlns:a14="http://schemas.microsoft.com/office/drawing/2010/main" xmlns="" w="9525">
                     <a:solidFill>
                       <a:srgbClr val="000000"/>
                     </a:solidFill>
@@ -9448,7 +9449,7 @@
               </a:ln>
               <a:extLst>
                 <a:ext uri="{91240B29-F687-4f45-9708-019B960494DF}">
-                  <a14:hiddenLine xmlns="" xmlns:a14="http://schemas.microsoft.com/office/drawing/2010/main" w="9525">
+                  <a14:hiddenLine xmlns:a14="http://schemas.microsoft.com/office/drawing/2010/main" xmlns="" w="9525">
                     <a:solidFill>
                       <a:srgbClr val="000000"/>
                     </a:solidFill>
@@ -9510,7 +9511,7 @@
               </a:ln>
               <a:extLst>
                 <a:ext uri="{91240B29-F687-4f45-9708-019B960494DF}">
-                  <a14:hiddenLine xmlns="" xmlns:a14="http://schemas.microsoft.com/office/drawing/2010/main" w="9525">
+                  <a14:hiddenLine xmlns:a14="http://schemas.microsoft.com/office/drawing/2010/main" xmlns="" w="9525">
                     <a:solidFill>
                       <a:srgbClr val="000000"/>
                     </a:solidFill>
@@ -9600,7 +9601,7 @@
               </a:ln>
               <a:extLst>
                 <a:ext uri="{91240B29-F687-4f45-9708-019B960494DF}">
-                  <a14:hiddenLine xmlns="" xmlns:a14="http://schemas.microsoft.com/office/drawing/2010/main" w="9525">
+                  <a14:hiddenLine xmlns:a14="http://schemas.microsoft.com/office/drawing/2010/main" xmlns="" w="9525">
                     <a:solidFill>
                       <a:srgbClr val="000000"/>
                     </a:solidFill>
@@ -9690,7 +9691,7 @@
               </a:ln>
               <a:extLst>
                 <a:ext uri="{91240B29-F687-4f45-9708-019B960494DF}">
-                  <a14:hiddenLine xmlns="" xmlns:a14="http://schemas.microsoft.com/office/drawing/2010/main" w="9525">
+                  <a14:hiddenLine xmlns:a14="http://schemas.microsoft.com/office/drawing/2010/main" xmlns="" w="9525">
                     <a:solidFill>
                       <a:srgbClr val="000000"/>
                     </a:solidFill>
@@ -9752,7 +9753,7 @@
               </a:ln>
               <a:extLst>
                 <a:ext uri="{91240B29-F687-4f45-9708-019B960494DF}">
-                  <a14:hiddenLine xmlns="" xmlns:a14="http://schemas.microsoft.com/office/drawing/2010/main" w="9525">
+                  <a14:hiddenLine xmlns:a14="http://schemas.microsoft.com/office/drawing/2010/main" xmlns="" w="9525">
                     <a:solidFill>
                       <a:srgbClr val="000000"/>
                     </a:solidFill>
@@ -9862,7 +9863,7 @@
               </a:ln>
               <a:extLst>
                 <a:ext uri="{91240B29-F687-4f45-9708-019B960494DF}">
-                  <a14:hiddenLine xmlns="" xmlns:a14="http://schemas.microsoft.com/office/drawing/2010/main" w="9525">
+                  <a14:hiddenLine xmlns:a14="http://schemas.microsoft.com/office/drawing/2010/main" xmlns="" w="9525">
                     <a:solidFill>
                       <a:srgbClr val="000000"/>
                     </a:solidFill>
@@ -9946,7 +9947,7 @@
               </a:ln>
               <a:extLst>
                 <a:ext uri="{91240B29-F687-4f45-9708-019B960494DF}">
-                  <a14:hiddenLine xmlns="" xmlns:a14="http://schemas.microsoft.com/office/drawing/2010/main" w="9525">
+                  <a14:hiddenLine xmlns:a14="http://schemas.microsoft.com/office/drawing/2010/main" xmlns="" w="9525">
                     <a:solidFill>
                       <a:srgbClr val="000000"/>
                     </a:solidFill>
@@ -10008,7 +10009,7 @@
               </a:ln>
               <a:extLst>
                 <a:ext uri="{91240B29-F687-4f45-9708-019B960494DF}">
-                  <a14:hiddenLine xmlns="" xmlns:a14="http://schemas.microsoft.com/office/drawing/2010/main" w="9525">
+                  <a14:hiddenLine xmlns:a14="http://schemas.microsoft.com/office/drawing/2010/main" xmlns="" w="9525">
                     <a:solidFill>
                       <a:srgbClr val="000000"/>
                     </a:solidFill>
@@ -10070,7 +10071,7 @@
               </a:ln>
               <a:extLst>
                 <a:ext uri="{91240B29-F687-4f45-9708-019B960494DF}">
-                  <a14:hiddenLine xmlns="" xmlns:a14="http://schemas.microsoft.com/office/drawing/2010/main" w="9525">
+                  <a14:hiddenLine xmlns:a14="http://schemas.microsoft.com/office/drawing/2010/main" xmlns="" w="9525">
                     <a:solidFill>
                       <a:srgbClr val="000000"/>
                     </a:solidFill>
@@ -10160,7 +10161,7 @@
               </a:ln>
               <a:extLst>
                 <a:ext uri="{91240B29-F687-4f45-9708-019B960494DF}">
-                  <a14:hiddenLine xmlns="" xmlns:a14="http://schemas.microsoft.com/office/drawing/2010/main" w="9525">
+                  <a14:hiddenLine xmlns:a14="http://schemas.microsoft.com/office/drawing/2010/main" xmlns="" w="9525">
                     <a:solidFill>
                       <a:srgbClr val="000000"/>
                     </a:solidFill>
@@ -10194,7 +10195,7 @@
               </a:ln>
               <a:extLst>
                 <a:ext uri="{91240B29-F687-4f45-9708-019B960494DF}">
-                  <a14:hiddenLine xmlns="" xmlns:a14="http://schemas.microsoft.com/office/drawing/2010/main" w="9525">
+                  <a14:hiddenLine xmlns:a14="http://schemas.microsoft.com/office/drawing/2010/main" xmlns="" w="9525">
                     <a:solidFill>
                       <a:srgbClr val="000000"/>
                     </a:solidFill>
@@ -10259,7 +10260,7 @@
               </a:ln>
               <a:extLst>
                 <a:ext uri="{91240B29-F687-4f45-9708-019B960494DF}">
-                  <a14:hiddenLine xmlns="" xmlns:a14="http://schemas.microsoft.com/office/drawing/2010/main" w="9525">
+                  <a14:hiddenLine xmlns:a14="http://schemas.microsoft.com/office/drawing/2010/main" xmlns="" w="9525">
                     <a:solidFill>
                       <a:srgbClr val="000000"/>
                     </a:solidFill>
@@ -10349,7 +10350,7 @@
               </a:ln>
               <a:extLst>
                 <a:ext uri="{91240B29-F687-4f45-9708-019B960494DF}">
-                  <a14:hiddenLine xmlns="" xmlns:a14="http://schemas.microsoft.com/office/drawing/2010/main" w="9525">
+                  <a14:hiddenLine xmlns:a14="http://schemas.microsoft.com/office/drawing/2010/main" xmlns="" w="9525">
                     <a:solidFill>
                       <a:srgbClr val="000000"/>
                     </a:solidFill>
@@ -10411,7 +10412,7 @@
               </a:ln>
               <a:extLst>
                 <a:ext uri="{91240B29-F687-4f45-9708-019B960494DF}">
-                  <a14:hiddenLine xmlns="" xmlns:a14="http://schemas.microsoft.com/office/drawing/2010/main" w="9525">
+                  <a14:hiddenLine xmlns:a14="http://schemas.microsoft.com/office/drawing/2010/main" xmlns="" w="9525">
                     <a:solidFill>
                       <a:srgbClr val="000000"/>
                     </a:solidFill>
@@ -10501,7 +10502,7 @@
               </a:ln>
               <a:extLst>
                 <a:ext uri="{91240B29-F687-4f45-9708-019B960494DF}">
-                  <a14:hiddenLine xmlns="" xmlns:a14="http://schemas.microsoft.com/office/drawing/2010/main" w="9525">
+                  <a14:hiddenLine xmlns:a14="http://schemas.microsoft.com/office/drawing/2010/main" xmlns="" w="9525">
                     <a:solidFill>
                       <a:srgbClr val="000000"/>
                     </a:solidFill>
@@ -10566,7 +10567,7 @@
               </a:ln>
               <a:extLst>
                 <a:ext uri="{91240B29-F687-4f45-9708-019B960494DF}">
-                  <a14:hiddenLine xmlns="" xmlns:a14="http://schemas.microsoft.com/office/drawing/2010/main" w="9525">
+                  <a14:hiddenLine xmlns:a14="http://schemas.microsoft.com/office/drawing/2010/main" xmlns="" w="9525">
                     <a:solidFill>
                       <a:srgbClr val="000000"/>
                     </a:solidFill>
@@ -10628,7 +10629,7 @@
               </a:ln>
               <a:extLst>
                 <a:ext uri="{91240B29-F687-4f45-9708-019B960494DF}">
-                  <a14:hiddenLine xmlns="" xmlns:a14="http://schemas.microsoft.com/office/drawing/2010/main" w="9525">
+                  <a14:hiddenLine xmlns:a14="http://schemas.microsoft.com/office/drawing/2010/main" xmlns="" w="9525">
                     <a:solidFill>
                       <a:srgbClr val="000000"/>
                     </a:solidFill>
@@ -10718,7 +10719,7 @@
               </a:ln>
               <a:extLst>
                 <a:ext uri="{91240B29-F687-4f45-9708-019B960494DF}">
-                  <a14:hiddenLine xmlns="" xmlns:a14="http://schemas.microsoft.com/office/drawing/2010/main" w="9525">
+                  <a14:hiddenLine xmlns:a14="http://schemas.microsoft.com/office/drawing/2010/main" xmlns="" w="9525">
                     <a:solidFill>
                       <a:srgbClr val="000000"/>
                     </a:solidFill>
@@ -10808,7 +10809,7 @@
               </a:ln>
               <a:extLst>
                 <a:ext uri="{91240B29-F687-4f45-9708-019B960494DF}">
-                  <a14:hiddenLine xmlns="" xmlns:a14="http://schemas.microsoft.com/office/drawing/2010/main" w="9525">
+                  <a14:hiddenLine xmlns:a14="http://schemas.microsoft.com/office/drawing/2010/main" xmlns="" w="9525">
                     <a:solidFill>
                       <a:srgbClr val="000000"/>
                     </a:solidFill>
@@ -10873,7 +10874,7 @@
               </a:ln>
               <a:extLst>
                 <a:ext uri="{91240B29-F687-4f45-9708-019B960494DF}">
-                  <a14:hiddenLine xmlns="" xmlns:a14="http://schemas.microsoft.com/office/drawing/2010/main" w="9525">
+                  <a14:hiddenLine xmlns:a14="http://schemas.microsoft.com/office/drawing/2010/main" xmlns="" w="9525">
                     <a:solidFill>
                       <a:srgbClr val="000000"/>
                     </a:solidFill>
@@ -10993,7 +10994,7 @@
               </a:ln>
               <a:extLst>
                 <a:ext uri="{91240B29-F687-4f45-9708-019B960494DF}">
-                  <a14:hiddenLine xmlns="" xmlns:a14="http://schemas.microsoft.com/office/drawing/2010/main" w="9525">
+                  <a14:hiddenLine xmlns:a14="http://schemas.microsoft.com/office/drawing/2010/main" xmlns="" w="9525">
                     <a:solidFill>
                       <a:srgbClr val="000000"/>
                     </a:solidFill>
@@ -11091,7 +11092,7 @@
               </a:ln>
               <a:extLst>
                 <a:ext uri="{91240B29-F687-4f45-9708-019B960494DF}">
-                  <a14:hiddenLine xmlns="" xmlns:a14="http://schemas.microsoft.com/office/drawing/2010/main" w="9525">
+                  <a14:hiddenLine xmlns:a14="http://schemas.microsoft.com/office/drawing/2010/main" xmlns="" w="9525">
                     <a:solidFill>
                       <a:srgbClr val="000000"/>
                     </a:solidFill>
@@ -11206,7 +11207,7 @@
               </a:ln>
               <a:extLst>
                 <a:ext uri="{91240B29-F687-4f45-9708-019B960494DF}">
-                  <a14:hiddenLine xmlns="" xmlns:a14="http://schemas.microsoft.com/office/drawing/2010/main" w="9525">
+                  <a14:hiddenLine xmlns:a14="http://schemas.microsoft.com/office/drawing/2010/main" xmlns="" w="9525">
                     <a:solidFill>
                       <a:srgbClr val="000000"/>
                     </a:solidFill>
@@ -11296,7 +11297,7 @@
               </a:ln>
               <a:extLst>
                 <a:ext uri="{91240B29-F687-4f45-9708-019B960494DF}">
-                  <a14:hiddenLine xmlns="" xmlns:a14="http://schemas.microsoft.com/office/drawing/2010/main" w="9525">
+                  <a14:hiddenLine xmlns:a14="http://schemas.microsoft.com/office/drawing/2010/main" xmlns="" w="9525">
                     <a:solidFill>
                       <a:srgbClr val="000000"/>
                     </a:solidFill>
@@ -11361,7 +11362,7 @@
               </a:ln>
               <a:extLst>
                 <a:ext uri="{91240B29-F687-4f45-9708-019B960494DF}">
-                  <a14:hiddenLine xmlns="" xmlns:a14="http://schemas.microsoft.com/office/drawing/2010/main" w="9525">
+                  <a14:hiddenLine xmlns:a14="http://schemas.microsoft.com/office/drawing/2010/main" xmlns="" w="9525">
                     <a:solidFill>
                       <a:srgbClr val="000000"/>
                     </a:solidFill>
@@ -11451,7 +11452,7 @@
               </a:ln>
               <a:extLst>
                 <a:ext uri="{91240B29-F687-4f45-9708-019B960494DF}">
-                  <a14:hiddenLine xmlns="" xmlns:a14="http://schemas.microsoft.com/office/drawing/2010/main" w="9525">
+                  <a14:hiddenLine xmlns:a14="http://schemas.microsoft.com/office/drawing/2010/main" xmlns="" w="9525">
                     <a:solidFill>
                       <a:srgbClr val="000000"/>
                     </a:solidFill>
@@ -11519,7 +11520,7 @@
               </a:ln>
               <a:extLst>
                 <a:ext uri="{91240B29-F687-4f45-9708-019B960494DF}">
-                  <a14:hiddenLine xmlns="" xmlns:a14="http://schemas.microsoft.com/office/drawing/2010/main" w="9525">
+                  <a14:hiddenLine xmlns:a14="http://schemas.microsoft.com/office/drawing/2010/main" xmlns="" w="9525">
                     <a:solidFill>
                       <a:srgbClr val="000000"/>
                     </a:solidFill>
@@ -11609,7 +11610,7 @@
               </a:ln>
               <a:extLst>
                 <a:ext uri="{91240B29-F687-4f45-9708-019B960494DF}">
-                  <a14:hiddenLine xmlns="" xmlns:a14="http://schemas.microsoft.com/office/drawing/2010/main" w="9525">
+                  <a14:hiddenLine xmlns:a14="http://schemas.microsoft.com/office/drawing/2010/main" xmlns="" w="9525">
                     <a:solidFill>
                       <a:srgbClr val="000000"/>
                     </a:solidFill>
@@ -11677,7 +11678,7 @@
               </a:ln>
               <a:extLst>
                 <a:ext uri="{91240B29-F687-4f45-9708-019B960494DF}">
-                  <a14:hiddenLine xmlns="" xmlns:a14="http://schemas.microsoft.com/office/drawing/2010/main" w="9525">
+                  <a14:hiddenLine xmlns:a14="http://schemas.microsoft.com/office/drawing/2010/main" xmlns="" w="9525">
                     <a:solidFill>
                       <a:srgbClr val="000000"/>
                     </a:solidFill>
@@ -11767,7 +11768,7 @@
               </a:ln>
               <a:extLst>
                 <a:ext uri="{91240B29-F687-4f45-9708-019B960494DF}">
-                  <a14:hiddenLine xmlns="" xmlns:a14="http://schemas.microsoft.com/office/drawing/2010/main" w="9525">
+                  <a14:hiddenLine xmlns:a14="http://schemas.microsoft.com/office/drawing/2010/main" xmlns="" w="9525">
                     <a:solidFill>
                       <a:srgbClr val="000000"/>
                     </a:solidFill>
@@ -11801,7 +11802,7 @@
               </a:ln>
               <a:extLst>
                 <a:ext uri="{91240B29-F687-4f45-9708-019B960494DF}">
-                  <a14:hiddenLine xmlns="" xmlns:a14="http://schemas.microsoft.com/office/drawing/2010/main" w="9525">
+                  <a14:hiddenLine xmlns:a14="http://schemas.microsoft.com/office/drawing/2010/main" xmlns="" w="9525">
                     <a:solidFill>
                       <a:srgbClr val="000000"/>
                     </a:solidFill>
@@ -12386,7 +12387,7 @@
           <a:p>
             <a:r>
               <a:rPr lang="es-ES" dirty="0"/>
-              <a:t>Sistema de mensajería y redes sociales</a:t>
+              <a:t>Sistema de mensajería y redes sociales (SMRS)</a:t>
             </a:r>
             <a:endParaRPr lang="es-CL" dirty="0"/>
           </a:p>
@@ -12673,12 +12674,99 @@
           </a:p>
         </p:txBody>
       </p:sp>
+      <p:pic>
+        <p:nvPicPr>
+          <p:cNvPr id="5" name="Marcador de contenido 4" descr="Imagen que contiene captura de pantalla&#10;&#10;Descripción generada con confianza muy alta">
+            <a:extLst>
+              <a:ext uri="{FF2B5EF4-FFF2-40B4-BE49-F238E27FC236}">
+                <a16:creationId xmlns:a16="http://schemas.microsoft.com/office/drawing/2014/main" id="{5EBB867F-E870-495F-994D-F2C4CCEBBE81}"/>
+              </a:ext>
+            </a:extLst>
+          </p:cNvPr>
+          <p:cNvPicPr>
+            <a:picLocks noGrp="1" noChangeAspect="1"/>
+          </p:cNvPicPr>
+          <p:nvPr>
+            <p:ph idx="1"/>
+          </p:nvPr>
+        </p:nvPicPr>
+        <p:blipFill>
+          <a:blip r:embed="rId2"/>
+          <a:stretch>
+            <a:fillRect/>
+          </a:stretch>
+        </p:blipFill>
+        <p:spPr>
+          <a:xfrm>
+            <a:off x="289561" y="1142999"/>
+            <a:ext cx="11673840" cy="5717439"/>
+          </a:xfrm>
+        </p:spPr>
+      </p:pic>
+    </p:spTree>
+    <p:extLst>
+      <p:ext uri="{BB962C8B-B14F-4D97-AF65-F5344CB8AC3E}">
+        <p14:creationId xmlns:p14="http://schemas.microsoft.com/office/powerpoint/2010/main" val="1153053009"/>
+      </p:ext>
+    </p:extLst>
+  </p:cSld>
+  <p:clrMapOvr>
+    <a:masterClrMapping/>
+  </p:clrMapOvr>
+</p:sld>
+</file>
+
+<file path=ppt/slides/slide12.xml><?xml version="1.0" encoding="utf-8"?>
+<p:sld xmlns:a="http://schemas.openxmlformats.org/drawingml/2006/main" xmlns:r="http://schemas.openxmlformats.org/officeDocument/2006/relationships" xmlns:p="http://schemas.openxmlformats.org/presentationml/2006/main">
+  <p:cSld>
+    <p:spTree>
+      <p:nvGrpSpPr>
+        <p:cNvPr id="1" name=""/>
+        <p:cNvGrpSpPr/>
+        <p:nvPr/>
+      </p:nvGrpSpPr>
+      <p:grpSpPr>
+        <a:xfrm>
+          <a:off x="0" y="0"/>
+          <a:ext cx="0" cy="0"/>
+          <a:chOff x="0" y="0"/>
+          <a:chExt cx="0" cy="0"/>
+        </a:xfrm>
+      </p:grpSpPr>
       <p:sp>
         <p:nvSpPr>
-          <p:cNvPr id="4" name="Marcador de contenido 3">
+          <p:cNvPr id="2" name="Título 1">
             <a:extLst>
               <a:ext uri="{FF2B5EF4-FFF2-40B4-BE49-F238E27FC236}">
-                <a16:creationId xmlns:a16="http://schemas.microsoft.com/office/drawing/2014/main" id="{7E8A7436-6F95-4F6E-8939-B88E84C5EEC3}"/>
+                <a16:creationId xmlns:a16="http://schemas.microsoft.com/office/drawing/2014/main" id="{5A0C8CA5-8641-4507-A29B-41CEB3C86CF6}"/>
+              </a:ext>
+            </a:extLst>
+          </p:cNvPr>
+          <p:cNvSpPr>
+            <a:spLocks noGrp="1"/>
+          </p:cNvSpPr>
+          <p:nvPr>
+            <p:ph type="title"/>
+          </p:nvPr>
+        </p:nvSpPr>
+        <p:spPr/>
+        <p:txBody>
+          <a:bodyPr/>
+          <a:lstStyle/>
+          <a:p>
+            <a:r>
+              <a:rPr lang="es-CL" dirty="0"/>
+              <a:t>Carta Gantt</a:t>
+            </a:r>
+          </a:p>
+        </p:txBody>
+      </p:sp>
+      <p:sp>
+        <p:nvSpPr>
+          <p:cNvPr id="3" name="Marcador de contenido 2">
+            <a:extLst>
+              <a:ext uri="{FF2B5EF4-FFF2-40B4-BE49-F238E27FC236}">
+                <a16:creationId xmlns:a16="http://schemas.microsoft.com/office/drawing/2014/main" id="{00CD0703-3B36-410A-83D7-063D9C3FDE93}"/>
               </a:ext>
             </a:extLst>
           </p:cNvPr>
@@ -12701,7 +12789,7 @@
     </p:spTree>
     <p:extLst>
       <p:ext uri="{BB962C8B-B14F-4D97-AF65-F5344CB8AC3E}">
-        <p14:creationId xmlns:p14="http://schemas.microsoft.com/office/powerpoint/2010/main" val="1153053009"/>
+        <p14:creationId xmlns:p14="http://schemas.microsoft.com/office/powerpoint/2010/main" val="3849764991"/>
       </p:ext>
     </p:extLst>
   </p:cSld>
@@ -13012,7 +13100,7 @@
           <a:noFill/>
           <a:extLst>
             <a:ext uri="{909E8E84-426E-40dd-AFC4-6F175D3DCCD1}">
-              <a14:hiddenFill xmlns:a14="http://schemas.microsoft.com/office/drawing/2010/main" xmlns:p14="http://schemas.microsoft.com/office/powerpoint/2010/main" xmlns:a16="http://schemas.microsoft.com/office/drawing/2014/main" xmlns="">
+              <a14:hiddenFill xmlns="" xmlns:a16="http://schemas.microsoft.com/office/drawing/2014/main" xmlns:p14="http://schemas.microsoft.com/office/powerpoint/2010/main" xmlns:a14="http://schemas.microsoft.com/office/drawing/2010/main">
                 <a:solidFill>
                   <a:srgbClr val="FFFFFF"/>
                 </a:solidFill>
@@ -13279,7 +13367,7 @@
             </a:ln>
             <a:extLst>
               <a:ext uri="{91240B29-F687-4f45-9708-019B960494DF}">
-                <a14:hiddenLine xmlns:a14="http://schemas.microsoft.com/office/drawing/2010/main" xmlns:p14="http://schemas.microsoft.com/office/powerpoint/2010/main" xmlns:a16="http://schemas.microsoft.com/office/drawing/2014/main" xmlns="" w="9525">
+                <a14:hiddenLine xmlns="" xmlns:a16="http://schemas.microsoft.com/office/drawing/2014/main" xmlns:p14="http://schemas.microsoft.com/office/powerpoint/2010/main" xmlns:a14="http://schemas.microsoft.com/office/drawing/2010/main" w="9525">
                   <a:solidFill>
                     <a:srgbClr val="000000"/>
                   </a:solidFill>
@@ -13384,7 +13472,7 @@
             </a:ln>
             <a:extLst>
               <a:ext uri="{91240B29-F687-4f45-9708-019B960494DF}">
-                <a14:hiddenLine xmlns:a14="http://schemas.microsoft.com/office/drawing/2010/main" xmlns:p14="http://schemas.microsoft.com/office/powerpoint/2010/main" xmlns:a16="http://schemas.microsoft.com/office/drawing/2014/main" xmlns="" w="9525">
+                <a14:hiddenLine xmlns="" xmlns:a16="http://schemas.microsoft.com/office/drawing/2014/main" xmlns:p14="http://schemas.microsoft.com/office/powerpoint/2010/main" xmlns:a14="http://schemas.microsoft.com/office/drawing/2010/main" w="9525">
                   <a:solidFill>
                     <a:srgbClr val="000000"/>
                   </a:solidFill>
@@ -13489,7 +13577,7 @@
             </a:ln>
             <a:extLst>
               <a:ext uri="{91240B29-F687-4f45-9708-019B960494DF}">
-                <a14:hiddenLine xmlns:a14="http://schemas.microsoft.com/office/drawing/2010/main" xmlns:p14="http://schemas.microsoft.com/office/powerpoint/2010/main" xmlns:a16="http://schemas.microsoft.com/office/drawing/2014/main" xmlns="" w="9525">
+                <a14:hiddenLine xmlns="" xmlns:a16="http://schemas.microsoft.com/office/drawing/2014/main" xmlns:p14="http://schemas.microsoft.com/office/powerpoint/2010/main" xmlns:a14="http://schemas.microsoft.com/office/drawing/2010/main" w="9525">
                   <a:solidFill>
                     <a:srgbClr val="000000"/>
                   </a:solidFill>
@@ -13566,7 +13654,7 @@
             </a:ln>
             <a:extLst>
               <a:ext uri="{91240B29-F687-4f45-9708-019B960494DF}">
-                <a14:hiddenLine xmlns:a14="http://schemas.microsoft.com/office/drawing/2010/main" xmlns:p14="http://schemas.microsoft.com/office/powerpoint/2010/main" xmlns:a16="http://schemas.microsoft.com/office/drawing/2014/main" xmlns="" w="9525">
+                <a14:hiddenLine xmlns="" xmlns:a16="http://schemas.microsoft.com/office/drawing/2014/main" xmlns:p14="http://schemas.microsoft.com/office/powerpoint/2010/main" xmlns:a14="http://schemas.microsoft.com/office/drawing/2010/main" w="9525">
                   <a:solidFill>
                     <a:srgbClr val="000000"/>
                   </a:solidFill>
@@ -13671,7 +13759,7 @@
             </a:ln>
             <a:extLst>
               <a:ext uri="{91240B29-F687-4f45-9708-019B960494DF}">
-                <a14:hiddenLine xmlns:a14="http://schemas.microsoft.com/office/drawing/2010/main" xmlns:p14="http://schemas.microsoft.com/office/powerpoint/2010/main" xmlns:a16="http://schemas.microsoft.com/office/drawing/2014/main" xmlns="" w="9525">
+                <a14:hiddenLine xmlns="" xmlns:a16="http://schemas.microsoft.com/office/drawing/2014/main" xmlns:p14="http://schemas.microsoft.com/office/powerpoint/2010/main" xmlns:a14="http://schemas.microsoft.com/office/drawing/2010/main" w="9525">
                   <a:solidFill>
                     <a:srgbClr val="000000"/>
                   </a:solidFill>
@@ -13748,7 +13836,7 @@
             </a:ln>
             <a:extLst>
               <a:ext uri="{91240B29-F687-4f45-9708-019B960494DF}">
-                <a14:hiddenLine xmlns:a14="http://schemas.microsoft.com/office/drawing/2010/main" xmlns:p14="http://schemas.microsoft.com/office/powerpoint/2010/main" xmlns:a16="http://schemas.microsoft.com/office/drawing/2014/main" xmlns="" w="9525">
+                <a14:hiddenLine xmlns="" xmlns:a16="http://schemas.microsoft.com/office/drawing/2014/main" xmlns:p14="http://schemas.microsoft.com/office/powerpoint/2010/main" xmlns:a14="http://schemas.microsoft.com/office/drawing/2010/main" w="9525">
                   <a:solidFill>
                     <a:srgbClr val="000000"/>
                   </a:solidFill>
@@ -13825,7 +13913,7 @@
             </a:ln>
             <a:extLst>
               <a:ext uri="{91240B29-F687-4f45-9708-019B960494DF}">
-                <a14:hiddenLine xmlns:a14="http://schemas.microsoft.com/office/drawing/2010/main" xmlns:p14="http://schemas.microsoft.com/office/powerpoint/2010/main" xmlns:a16="http://schemas.microsoft.com/office/drawing/2014/main" xmlns="" w="9525">
+                <a14:hiddenLine xmlns="" xmlns:a16="http://schemas.microsoft.com/office/drawing/2014/main" xmlns:p14="http://schemas.microsoft.com/office/powerpoint/2010/main" xmlns:a14="http://schemas.microsoft.com/office/drawing/2010/main" w="9525">
                   <a:solidFill>
                     <a:srgbClr val="000000"/>
                   </a:solidFill>
@@ -13930,7 +14018,7 @@
             </a:ln>
             <a:extLst>
               <a:ext uri="{91240B29-F687-4f45-9708-019B960494DF}">
-                <a14:hiddenLine xmlns:a14="http://schemas.microsoft.com/office/drawing/2010/main" xmlns:p14="http://schemas.microsoft.com/office/powerpoint/2010/main" xmlns:a16="http://schemas.microsoft.com/office/drawing/2014/main" xmlns="" w="9525">
+                <a14:hiddenLine xmlns="" xmlns:a16="http://schemas.microsoft.com/office/drawing/2014/main" xmlns:p14="http://schemas.microsoft.com/office/powerpoint/2010/main" xmlns:a14="http://schemas.microsoft.com/office/drawing/2010/main" w="9525">
                   <a:solidFill>
                     <a:srgbClr val="000000"/>
                   </a:solidFill>
@@ -14035,7 +14123,7 @@
             </a:ln>
             <a:extLst>
               <a:ext uri="{91240B29-F687-4f45-9708-019B960494DF}">
-                <a14:hiddenLine xmlns:a14="http://schemas.microsoft.com/office/drawing/2010/main" xmlns:p14="http://schemas.microsoft.com/office/powerpoint/2010/main" xmlns:a16="http://schemas.microsoft.com/office/drawing/2014/main" xmlns="" w="9525">
+                <a14:hiddenLine xmlns="" xmlns:a16="http://schemas.microsoft.com/office/drawing/2014/main" xmlns:p14="http://schemas.microsoft.com/office/powerpoint/2010/main" xmlns:a14="http://schemas.microsoft.com/office/drawing/2010/main" w="9525">
                   <a:solidFill>
                     <a:srgbClr val="000000"/>
                   </a:solidFill>
@@ -14112,7 +14200,7 @@
             </a:ln>
             <a:extLst>
               <a:ext uri="{91240B29-F687-4f45-9708-019B960494DF}">
-                <a14:hiddenLine xmlns:a14="http://schemas.microsoft.com/office/drawing/2010/main" xmlns:p14="http://schemas.microsoft.com/office/powerpoint/2010/main" xmlns:a16="http://schemas.microsoft.com/office/drawing/2014/main" xmlns="" w="9525">
+                <a14:hiddenLine xmlns="" xmlns:a16="http://schemas.microsoft.com/office/drawing/2014/main" xmlns:p14="http://schemas.microsoft.com/office/powerpoint/2010/main" xmlns:a14="http://schemas.microsoft.com/office/drawing/2010/main" w="9525">
                   <a:solidFill>
                     <a:srgbClr val="000000"/>
                   </a:solidFill>
@@ -14237,7 +14325,7 @@
             </a:ln>
             <a:extLst>
               <a:ext uri="{91240B29-F687-4f45-9708-019B960494DF}">
-                <a14:hiddenLine xmlns:a14="http://schemas.microsoft.com/office/drawing/2010/main" xmlns:p14="http://schemas.microsoft.com/office/powerpoint/2010/main" xmlns:a16="http://schemas.microsoft.com/office/drawing/2014/main" xmlns="" w="9525">
+                <a14:hiddenLine xmlns="" xmlns:a16="http://schemas.microsoft.com/office/drawing/2014/main" xmlns:p14="http://schemas.microsoft.com/office/powerpoint/2010/main" xmlns:a14="http://schemas.microsoft.com/office/drawing/2010/main" w="9525">
                   <a:solidFill>
                     <a:srgbClr val="000000"/>
                   </a:solidFill>
@@ -14351,7 +14439,7 @@
             </a:ln>
             <a:extLst>
               <a:ext uri="{91240B29-F687-4f45-9708-019B960494DF}">
-                <a14:hiddenLine xmlns:a14="http://schemas.microsoft.com/office/drawing/2010/main" xmlns:p14="http://schemas.microsoft.com/office/powerpoint/2010/main" xmlns:a16="http://schemas.microsoft.com/office/drawing/2014/main" xmlns="" w="9525">
+                <a14:hiddenLine xmlns="" xmlns:a16="http://schemas.microsoft.com/office/drawing/2014/main" xmlns:p14="http://schemas.microsoft.com/office/powerpoint/2010/main" xmlns:a14="http://schemas.microsoft.com/office/drawing/2010/main" w="9525">
                   <a:solidFill>
                     <a:srgbClr val="000000"/>
                   </a:solidFill>
@@ -14428,7 +14516,7 @@
             </a:ln>
             <a:extLst>
               <a:ext uri="{91240B29-F687-4f45-9708-019B960494DF}">
-                <a14:hiddenLine xmlns:a14="http://schemas.microsoft.com/office/drawing/2010/main" xmlns:p14="http://schemas.microsoft.com/office/powerpoint/2010/main" xmlns:a16="http://schemas.microsoft.com/office/drawing/2014/main" xmlns="" w="9525">
+                <a14:hiddenLine xmlns="" xmlns:a16="http://schemas.microsoft.com/office/drawing/2014/main" xmlns:p14="http://schemas.microsoft.com/office/powerpoint/2010/main" xmlns:a14="http://schemas.microsoft.com/office/drawing/2010/main" w="9525">
                   <a:solidFill>
                     <a:srgbClr val="000000"/>
                   </a:solidFill>
@@ -14505,7 +14593,7 @@
             </a:ln>
             <a:extLst>
               <a:ext uri="{91240B29-F687-4f45-9708-019B960494DF}">
-                <a14:hiddenLine xmlns:a14="http://schemas.microsoft.com/office/drawing/2010/main" xmlns:p14="http://schemas.microsoft.com/office/powerpoint/2010/main" xmlns:a16="http://schemas.microsoft.com/office/drawing/2014/main" xmlns="" w="9525">
+                <a14:hiddenLine xmlns="" xmlns:a16="http://schemas.microsoft.com/office/drawing/2014/main" xmlns:p14="http://schemas.microsoft.com/office/powerpoint/2010/main" xmlns:a14="http://schemas.microsoft.com/office/drawing/2010/main" w="9525">
                   <a:solidFill>
                     <a:srgbClr val="000000"/>
                   </a:solidFill>
@@ -14610,7 +14698,7 @@
             </a:ln>
             <a:extLst>
               <a:ext uri="{91240B29-F687-4f45-9708-019B960494DF}">
-                <a14:hiddenLine xmlns:a14="http://schemas.microsoft.com/office/drawing/2010/main" xmlns:p14="http://schemas.microsoft.com/office/powerpoint/2010/main" xmlns:a16="http://schemas.microsoft.com/office/drawing/2014/main" xmlns="" w="9525">
+                <a14:hiddenLine xmlns="" xmlns:a16="http://schemas.microsoft.com/office/drawing/2014/main" xmlns:p14="http://schemas.microsoft.com/office/powerpoint/2010/main" xmlns:a14="http://schemas.microsoft.com/office/drawing/2010/main" w="9525">
                   <a:solidFill>
                     <a:srgbClr val="000000"/>
                   </a:solidFill>
@@ -14659,7 +14747,7 @@
             </a:ln>
             <a:extLst>
               <a:ext uri="{91240B29-F687-4f45-9708-019B960494DF}">
-                <a14:hiddenLine xmlns:a14="http://schemas.microsoft.com/office/drawing/2010/main" xmlns:p14="http://schemas.microsoft.com/office/powerpoint/2010/main" xmlns:a16="http://schemas.microsoft.com/office/drawing/2014/main" xmlns="" w="9525">
+                <a14:hiddenLine xmlns="" xmlns:a16="http://schemas.microsoft.com/office/drawing/2014/main" xmlns:p14="http://schemas.microsoft.com/office/powerpoint/2010/main" xmlns:a14="http://schemas.microsoft.com/office/drawing/2010/main" w="9525">
                   <a:solidFill>
                     <a:srgbClr val="000000"/>
                   </a:solidFill>
@@ -14739,7 +14827,7 @@
             </a:ln>
             <a:extLst>
               <a:ext uri="{91240B29-F687-4f45-9708-019B960494DF}">
-                <a14:hiddenLine xmlns:a14="http://schemas.microsoft.com/office/drawing/2010/main" xmlns:p14="http://schemas.microsoft.com/office/powerpoint/2010/main" xmlns:a16="http://schemas.microsoft.com/office/drawing/2014/main" xmlns="" w="9525">
+                <a14:hiddenLine xmlns="" xmlns:a16="http://schemas.microsoft.com/office/drawing/2014/main" xmlns:p14="http://schemas.microsoft.com/office/powerpoint/2010/main" xmlns:a14="http://schemas.microsoft.com/office/drawing/2010/main" w="9525">
                   <a:solidFill>
                     <a:srgbClr val="000000"/>
                   </a:solidFill>
@@ -14844,7 +14932,7 @@
             </a:ln>
             <a:extLst>
               <a:ext uri="{91240B29-F687-4f45-9708-019B960494DF}">
-                <a14:hiddenLine xmlns:a14="http://schemas.microsoft.com/office/drawing/2010/main" xmlns:p14="http://schemas.microsoft.com/office/powerpoint/2010/main" xmlns:a16="http://schemas.microsoft.com/office/drawing/2014/main" xmlns="" w="9525">
+                <a14:hiddenLine xmlns="" xmlns:a16="http://schemas.microsoft.com/office/drawing/2014/main" xmlns:p14="http://schemas.microsoft.com/office/powerpoint/2010/main" xmlns:a14="http://schemas.microsoft.com/office/drawing/2010/main" w="9525">
                   <a:solidFill>
                     <a:srgbClr val="000000"/>
                   </a:solidFill>
@@ -14921,7 +15009,7 @@
             </a:ln>
             <a:extLst>
               <a:ext uri="{91240B29-F687-4f45-9708-019B960494DF}">
-                <a14:hiddenLine xmlns:a14="http://schemas.microsoft.com/office/drawing/2010/main" xmlns:p14="http://schemas.microsoft.com/office/powerpoint/2010/main" xmlns:a16="http://schemas.microsoft.com/office/drawing/2014/main" xmlns="" w="9525">
+                <a14:hiddenLine xmlns="" xmlns:a16="http://schemas.microsoft.com/office/drawing/2014/main" xmlns:p14="http://schemas.microsoft.com/office/powerpoint/2010/main" xmlns:a14="http://schemas.microsoft.com/office/drawing/2010/main" w="9525">
                   <a:solidFill>
                     <a:srgbClr val="000000"/>
                   </a:solidFill>
@@ -15026,7 +15114,7 @@
             </a:ln>
             <a:extLst>
               <a:ext uri="{91240B29-F687-4f45-9708-019B960494DF}">
-                <a14:hiddenLine xmlns:a14="http://schemas.microsoft.com/office/drawing/2010/main" xmlns:p14="http://schemas.microsoft.com/office/powerpoint/2010/main" xmlns:a16="http://schemas.microsoft.com/office/drawing/2014/main" xmlns="" w="9525">
+                <a14:hiddenLine xmlns="" xmlns:a16="http://schemas.microsoft.com/office/drawing/2014/main" xmlns:p14="http://schemas.microsoft.com/office/powerpoint/2010/main" xmlns:a14="http://schemas.microsoft.com/office/drawing/2010/main" w="9525">
                   <a:solidFill>
                     <a:srgbClr val="000000"/>
                   </a:solidFill>
@@ -15106,7 +15194,7 @@
             </a:ln>
             <a:extLst>
               <a:ext uri="{91240B29-F687-4f45-9708-019B960494DF}">
-                <a14:hiddenLine xmlns:a14="http://schemas.microsoft.com/office/drawing/2010/main" xmlns:p14="http://schemas.microsoft.com/office/powerpoint/2010/main" xmlns:a16="http://schemas.microsoft.com/office/drawing/2014/main" xmlns="" w="9525">
+                <a14:hiddenLine xmlns="" xmlns:a16="http://schemas.microsoft.com/office/drawing/2014/main" xmlns:p14="http://schemas.microsoft.com/office/powerpoint/2010/main" xmlns:a14="http://schemas.microsoft.com/office/drawing/2010/main" w="9525">
                   <a:solidFill>
                     <a:srgbClr val="000000"/>
                   </a:solidFill>
@@ -15183,7 +15271,7 @@
             </a:ln>
             <a:extLst>
               <a:ext uri="{91240B29-F687-4f45-9708-019B960494DF}">
-                <a14:hiddenLine xmlns:a14="http://schemas.microsoft.com/office/drawing/2010/main" xmlns:p14="http://schemas.microsoft.com/office/powerpoint/2010/main" xmlns:a16="http://schemas.microsoft.com/office/drawing/2014/main" xmlns="" w="9525">
+                <a14:hiddenLine xmlns="" xmlns:a16="http://schemas.microsoft.com/office/drawing/2014/main" xmlns:p14="http://schemas.microsoft.com/office/powerpoint/2010/main" xmlns:a14="http://schemas.microsoft.com/office/drawing/2010/main" w="9525">
                   <a:solidFill>
                     <a:srgbClr val="000000"/>
                   </a:solidFill>
@@ -15288,7 +15376,7 @@
             </a:ln>
             <a:extLst>
               <a:ext uri="{91240B29-F687-4f45-9708-019B960494DF}">
-                <a14:hiddenLine xmlns:a14="http://schemas.microsoft.com/office/drawing/2010/main" xmlns:p14="http://schemas.microsoft.com/office/powerpoint/2010/main" xmlns:a16="http://schemas.microsoft.com/office/drawing/2014/main" xmlns="" w="9525">
+                <a14:hiddenLine xmlns="" xmlns:a16="http://schemas.microsoft.com/office/drawing/2014/main" xmlns:p14="http://schemas.microsoft.com/office/powerpoint/2010/main" xmlns:a14="http://schemas.microsoft.com/office/drawing/2010/main" w="9525">
                   <a:solidFill>
                     <a:srgbClr val="000000"/>
                   </a:solidFill>
@@ -15393,7 +15481,7 @@
             </a:ln>
             <a:extLst>
               <a:ext uri="{91240B29-F687-4f45-9708-019B960494DF}">
-                <a14:hiddenLine xmlns:a14="http://schemas.microsoft.com/office/drawing/2010/main" xmlns:p14="http://schemas.microsoft.com/office/powerpoint/2010/main" xmlns:a16="http://schemas.microsoft.com/office/drawing/2014/main" xmlns="" w="9525">
+                <a14:hiddenLine xmlns="" xmlns:a16="http://schemas.microsoft.com/office/drawing/2014/main" xmlns:p14="http://schemas.microsoft.com/office/powerpoint/2010/main" xmlns:a14="http://schemas.microsoft.com/office/drawing/2010/main" w="9525">
                   <a:solidFill>
                     <a:srgbClr val="000000"/>
                   </a:solidFill>
@@ -15473,7 +15561,7 @@
             </a:ln>
             <a:extLst>
               <a:ext uri="{91240B29-F687-4f45-9708-019B960494DF}">
-                <a14:hiddenLine xmlns:a14="http://schemas.microsoft.com/office/drawing/2010/main" xmlns:p14="http://schemas.microsoft.com/office/powerpoint/2010/main" xmlns:a16="http://schemas.microsoft.com/office/drawing/2014/main" xmlns="" w="9525">
+                <a14:hiddenLine xmlns="" xmlns:a16="http://schemas.microsoft.com/office/drawing/2014/main" xmlns:p14="http://schemas.microsoft.com/office/powerpoint/2010/main" xmlns:a14="http://schemas.microsoft.com/office/drawing/2010/main" w="9525">
                   <a:solidFill>
                     <a:srgbClr val="000000"/>
                   </a:solidFill>
@@ -15608,7 +15696,7 @@
             </a:ln>
             <a:extLst>
               <a:ext uri="{91240B29-F687-4f45-9708-019B960494DF}">
-                <a14:hiddenLine xmlns:a14="http://schemas.microsoft.com/office/drawing/2010/main" xmlns:p14="http://schemas.microsoft.com/office/powerpoint/2010/main" xmlns:a16="http://schemas.microsoft.com/office/drawing/2014/main" xmlns="" w="9525">
+                <a14:hiddenLine xmlns="" xmlns:a16="http://schemas.microsoft.com/office/drawing/2014/main" xmlns:p14="http://schemas.microsoft.com/office/powerpoint/2010/main" xmlns:a14="http://schemas.microsoft.com/office/drawing/2010/main" w="9525">
                   <a:solidFill>
                     <a:srgbClr val="000000"/>
                   </a:solidFill>

</xml_diff>